<commit_message>
add resized logo and favicon files
</commit_message>
<xml_diff>
--- a/resources/logo.pptx
+++ b/resources/logo.pptx
@@ -245,7 +245,7 @@
           <a:p>
             <a:fld id="{6F712696-B7F3-46EF-8565-73E1D8D352C7}" type="datetimeFigureOut">
               <a:rPr lang="en-GB" smtClean="0"/>
-              <a:t>30/08/2022</a:t>
+              <a:t>31/08/2022</a:t>
             </a:fld>
             <a:endParaRPr lang="en-GB"/>
           </a:p>
@@ -415,7 +415,7 @@
           <a:p>
             <a:fld id="{6F712696-B7F3-46EF-8565-73E1D8D352C7}" type="datetimeFigureOut">
               <a:rPr lang="en-GB" smtClean="0"/>
-              <a:t>30/08/2022</a:t>
+              <a:t>31/08/2022</a:t>
             </a:fld>
             <a:endParaRPr lang="en-GB"/>
           </a:p>
@@ -595,7 +595,7 @@
           <a:p>
             <a:fld id="{6F712696-B7F3-46EF-8565-73E1D8D352C7}" type="datetimeFigureOut">
               <a:rPr lang="en-GB" smtClean="0"/>
-              <a:t>30/08/2022</a:t>
+              <a:t>31/08/2022</a:t>
             </a:fld>
             <a:endParaRPr lang="en-GB"/>
           </a:p>
@@ -765,7 +765,7 @@
           <a:p>
             <a:fld id="{6F712696-B7F3-46EF-8565-73E1D8D352C7}" type="datetimeFigureOut">
               <a:rPr lang="en-GB" smtClean="0"/>
-              <a:t>30/08/2022</a:t>
+              <a:t>31/08/2022</a:t>
             </a:fld>
             <a:endParaRPr lang="en-GB"/>
           </a:p>
@@ -1009,7 +1009,7 @@
           <a:p>
             <a:fld id="{6F712696-B7F3-46EF-8565-73E1D8D352C7}" type="datetimeFigureOut">
               <a:rPr lang="en-GB" smtClean="0"/>
-              <a:t>30/08/2022</a:t>
+              <a:t>31/08/2022</a:t>
             </a:fld>
             <a:endParaRPr lang="en-GB"/>
           </a:p>
@@ -1241,7 +1241,7 @@
           <a:p>
             <a:fld id="{6F712696-B7F3-46EF-8565-73E1D8D352C7}" type="datetimeFigureOut">
               <a:rPr lang="en-GB" smtClean="0"/>
-              <a:t>30/08/2022</a:t>
+              <a:t>31/08/2022</a:t>
             </a:fld>
             <a:endParaRPr lang="en-GB"/>
           </a:p>
@@ -1608,7 +1608,7 @@
           <a:p>
             <a:fld id="{6F712696-B7F3-46EF-8565-73E1D8D352C7}" type="datetimeFigureOut">
               <a:rPr lang="en-GB" smtClean="0"/>
-              <a:t>30/08/2022</a:t>
+              <a:t>31/08/2022</a:t>
             </a:fld>
             <a:endParaRPr lang="en-GB"/>
           </a:p>
@@ -1726,7 +1726,7 @@
           <a:p>
             <a:fld id="{6F712696-B7F3-46EF-8565-73E1D8D352C7}" type="datetimeFigureOut">
               <a:rPr lang="en-GB" smtClean="0"/>
-              <a:t>30/08/2022</a:t>
+              <a:t>31/08/2022</a:t>
             </a:fld>
             <a:endParaRPr lang="en-GB"/>
           </a:p>
@@ -1821,7 +1821,7 @@
           <a:p>
             <a:fld id="{6F712696-B7F3-46EF-8565-73E1D8D352C7}" type="datetimeFigureOut">
               <a:rPr lang="en-GB" smtClean="0"/>
-              <a:t>30/08/2022</a:t>
+              <a:t>31/08/2022</a:t>
             </a:fld>
             <a:endParaRPr lang="en-GB"/>
           </a:p>
@@ -2098,7 +2098,7 @@
           <a:p>
             <a:fld id="{6F712696-B7F3-46EF-8565-73E1D8D352C7}" type="datetimeFigureOut">
               <a:rPr lang="en-GB" smtClean="0"/>
-              <a:t>30/08/2022</a:t>
+              <a:t>31/08/2022</a:t>
             </a:fld>
             <a:endParaRPr lang="en-GB"/>
           </a:p>
@@ -2355,7 +2355,7 @@
           <a:p>
             <a:fld id="{6F712696-B7F3-46EF-8565-73E1D8D352C7}" type="datetimeFigureOut">
               <a:rPr lang="en-GB" smtClean="0"/>
-              <a:t>30/08/2022</a:t>
+              <a:t>31/08/2022</a:t>
             </a:fld>
             <a:endParaRPr lang="en-GB"/>
           </a:p>
@@ -2568,7 +2568,7 @@
           <a:p>
             <a:fld id="{6F712696-B7F3-46EF-8565-73E1D8D352C7}" type="datetimeFigureOut">
               <a:rPr lang="en-GB" smtClean="0"/>
-              <a:t>30/08/2022</a:t>
+              <a:t>31/08/2022</a:t>
             </a:fld>
             <a:endParaRPr lang="en-GB"/>
           </a:p>
@@ -3481,8 +3481,17 @@
               <a:rPr lang="en-GB" dirty="0">
                 <a:sym typeface="Wingdings" panose="05000000000000000000" pitchFamily="2" charset="2"/>
               </a:rPr>
-              <a:t>The master version of this file can be found at </a:t>
-            </a:r>
+              <a:t>Note that Microsoft Edge has issues downsizing images, so you may need to manually resize, e.g. using an online tool, for use </a:t>
+            </a:r>
+            <a:r>
+              <a:rPr lang="en-GB">
+                <a:sym typeface="Wingdings" panose="05000000000000000000" pitchFamily="2" charset="2"/>
+              </a:rPr>
+              <a:t>in websites.</a:t>
+            </a:r>
+            <a:endParaRPr lang="en-GB" dirty="0">
+              <a:sym typeface="Wingdings" panose="05000000000000000000" pitchFamily="2" charset="2"/>
+            </a:endParaRPr>
           </a:p>
           <a:p>
             <a:pPr marL="0" indent="0">
@@ -3496,6 +3505,12 @@
             <a:pPr marL="0" indent="0">
               <a:buNone/>
             </a:pPr>
+            <a:r>
+              <a:rPr lang="en-GB" dirty="0">
+                <a:sym typeface="Wingdings" panose="05000000000000000000" pitchFamily="2" charset="2"/>
+              </a:rPr>
+              <a:t>The master version of this file can be found at </a:t>
+            </a:r>
             <a:r>
               <a:rPr lang="en-GB" dirty="0"/>
               <a:t>https://github.com/DfE-R-Community/dfe-r-community.github.io/tree/main/resources/logo.pptx</a:t>

</xml_diff>